<commit_message>
Revert "Revert "Reproducable Results""
This reverts commit 696922c2efd493718cb66d96a205d13e1d50a74b.
</commit_message>
<xml_diff>
--- a/smart_search/MIRC/Prof_Daniela/preliminary_results_clustering_MIRC.pptx
+++ b/smart_search/MIRC/Prof_Daniela/preliminary_results_clustering_MIRC.pptx
@@ -202,7 +202,7 @@
           <a:p>
             <a:fld id="{F36C81F3-AF5D-43CA-87AF-543D1C06B683}" type="datetimeFigureOut">
               <a:rPr lang="en-US" smtClean="0"/>
-              <a:t>6/20/2017</a:t>
+              <a:t>6/30/2017</a:t>
             </a:fld>
             <a:endParaRPr lang="en-US"/>
           </a:p>
@@ -266,38 +266,37 @@
           <a:p>
             <a:pPr lvl="0"/>
             <a:r>
-              <a:rPr lang="en-US" smtClean="0"/>
+              <a:rPr lang="en-US"/>
               <a:t>Edit Master text styles</a:t>
             </a:r>
           </a:p>
           <a:p>
             <a:pPr lvl="1"/>
             <a:r>
-              <a:rPr lang="en-US" smtClean="0"/>
+              <a:rPr lang="en-US"/>
               <a:t>Second level</a:t>
             </a:r>
           </a:p>
           <a:p>
             <a:pPr lvl="2"/>
             <a:r>
-              <a:rPr lang="en-US" smtClean="0"/>
+              <a:rPr lang="en-US"/>
               <a:t>Third level</a:t>
             </a:r>
           </a:p>
           <a:p>
             <a:pPr lvl="3"/>
             <a:r>
-              <a:rPr lang="en-US" smtClean="0"/>
+              <a:rPr lang="en-US"/>
               <a:t>Fourth level</a:t>
             </a:r>
           </a:p>
           <a:p>
             <a:pPr lvl="4"/>
             <a:r>
-              <a:rPr lang="en-US" smtClean="0"/>
+              <a:rPr lang="en-US"/>
               <a:t>Fifth level</a:t>
             </a:r>
-            <a:endParaRPr lang="en-US"/>
           </a:p>
         </p:txBody>
       </p:sp>
@@ -935,7 +934,7 @@
           <a:p>
             <a:fld id="{796ACB52-A787-4CCF-9BC0-E9166C13B2E0}" type="datetimeFigureOut">
               <a:rPr lang="en-US" smtClean="0"/>
-              <a:t>6/20/2017</a:t>
+              <a:t>6/30/2017</a:t>
             </a:fld>
             <a:endParaRPr lang="en-US"/>
           </a:p>
@@ -1103,7 +1102,7 @@
           <a:p>
             <a:fld id="{796ACB52-A787-4CCF-9BC0-E9166C13B2E0}" type="datetimeFigureOut">
               <a:rPr lang="en-US" smtClean="0"/>
-              <a:t>6/20/2017</a:t>
+              <a:t>6/30/2017</a:t>
             </a:fld>
             <a:endParaRPr lang="en-US"/>
           </a:p>
@@ -1281,7 +1280,7 @@
           <a:p>
             <a:fld id="{796ACB52-A787-4CCF-9BC0-E9166C13B2E0}" type="datetimeFigureOut">
               <a:rPr lang="en-US" smtClean="0"/>
-              <a:t>6/20/2017</a:t>
+              <a:t>6/30/2017</a:t>
             </a:fld>
             <a:endParaRPr lang="en-US"/>
           </a:p>
@@ -1449,7 +1448,7 @@
           <a:p>
             <a:fld id="{796ACB52-A787-4CCF-9BC0-E9166C13B2E0}" type="datetimeFigureOut">
               <a:rPr lang="en-US" smtClean="0"/>
-              <a:t>6/20/2017</a:t>
+              <a:t>6/30/2017</a:t>
             </a:fld>
             <a:endParaRPr lang="en-US"/>
           </a:p>
@@ -1694,7 +1693,7 @@
           <a:p>
             <a:fld id="{796ACB52-A787-4CCF-9BC0-E9166C13B2E0}" type="datetimeFigureOut">
               <a:rPr lang="en-US" smtClean="0"/>
-              <a:t>6/20/2017</a:t>
+              <a:t>6/30/2017</a:t>
             </a:fld>
             <a:endParaRPr lang="en-US"/>
           </a:p>
@@ -1923,7 +1922,7 @@
           <a:p>
             <a:fld id="{796ACB52-A787-4CCF-9BC0-E9166C13B2E0}" type="datetimeFigureOut">
               <a:rPr lang="en-US" smtClean="0"/>
-              <a:t>6/20/2017</a:t>
+              <a:t>6/30/2017</a:t>
             </a:fld>
             <a:endParaRPr lang="en-US"/>
           </a:p>
@@ -2287,7 +2286,7 @@
           <a:p>
             <a:fld id="{796ACB52-A787-4CCF-9BC0-E9166C13B2E0}" type="datetimeFigureOut">
               <a:rPr lang="en-US" smtClean="0"/>
-              <a:t>6/20/2017</a:t>
+              <a:t>6/30/2017</a:t>
             </a:fld>
             <a:endParaRPr lang="en-US"/>
           </a:p>
@@ -2404,7 +2403,7 @@
           <a:p>
             <a:fld id="{796ACB52-A787-4CCF-9BC0-E9166C13B2E0}" type="datetimeFigureOut">
               <a:rPr lang="en-US" smtClean="0"/>
-              <a:t>6/20/2017</a:t>
+              <a:t>6/30/2017</a:t>
             </a:fld>
             <a:endParaRPr lang="en-US"/>
           </a:p>
@@ -2499,7 +2498,7 @@
           <a:p>
             <a:fld id="{796ACB52-A787-4CCF-9BC0-E9166C13B2E0}" type="datetimeFigureOut">
               <a:rPr lang="en-US" smtClean="0"/>
-              <a:t>6/20/2017</a:t>
+              <a:t>6/30/2017</a:t>
             </a:fld>
             <a:endParaRPr lang="en-US"/>
           </a:p>
@@ -2774,7 +2773,7 @@
           <a:p>
             <a:fld id="{796ACB52-A787-4CCF-9BC0-E9166C13B2E0}" type="datetimeFigureOut">
               <a:rPr lang="en-US" smtClean="0"/>
-              <a:t>6/20/2017</a:t>
+              <a:t>6/30/2017</a:t>
             </a:fld>
             <a:endParaRPr lang="en-US"/>
           </a:p>
@@ -3026,7 +3025,7 @@
           <a:p>
             <a:fld id="{796ACB52-A787-4CCF-9BC0-E9166C13B2E0}" type="datetimeFigureOut">
               <a:rPr lang="en-US" smtClean="0"/>
-              <a:t>6/20/2017</a:t>
+              <a:t>6/30/2017</a:t>
             </a:fld>
             <a:endParaRPr lang="en-US"/>
           </a:p>
@@ -3237,7 +3236,7 @@
           <a:p>
             <a:fld id="{796ACB52-A787-4CCF-9BC0-E9166C13B2E0}" type="datetimeFigureOut">
               <a:rPr lang="en-US" smtClean="0"/>
-              <a:t>6/20/2017</a:t>
+              <a:t>6/30/2017</a:t>
             </a:fld>
             <a:endParaRPr lang="en-US"/>
           </a:p>
@@ -3664,21 +3663,8 @@
           <a:p>
             <a:r>
               <a:rPr lang="en-US" b="1" u="sng" dirty="0"/>
-              <a:t>Preliminary Results on </a:t>
+              <a:t>Preliminary Results on Clustering MIRC TFS</a:t>
             </a:r>
-            <a:r>
-              <a:rPr lang="en-US" b="1" u="sng" dirty="0" smtClean="0"/>
-              <a:t>Clustering </a:t>
-            </a:r>
-            <a:r>
-              <a:rPr lang="en-US" b="1" u="sng" dirty="0"/>
-              <a:t>MIRC </a:t>
-            </a:r>
-            <a:r>
-              <a:rPr lang="en-US" b="1" u="sng" dirty="0" smtClean="0"/>
-              <a:t>TFS</a:t>
-            </a:r>
-            <a:endParaRPr lang="en-US" b="1" u="sng" dirty="0"/>
           </a:p>
         </p:txBody>
       </p:sp>
@@ -3777,7 +3763,7 @@
                         <a:defRPr/>
                       </a:pPr>
                       <a:r>
-                        <a:rPr lang="en-US" b="1" dirty="0" err="1" smtClean="0">
+                        <a:rPr lang="en-US" b="1" dirty="0" err="1">
                           <a:solidFill>
                             <a:schemeClr val="tx1"/>
                           </a:solidFill>
@@ -3785,7 +3771,7 @@
                         <a:t>BigCluster</a:t>
                       </a:r>
                       <a:r>
-                        <a:rPr lang="en-US" b="1" baseline="0" dirty="0" smtClean="0">
+                        <a:rPr lang="en-US" b="1" baseline="0" dirty="0">
                           <a:solidFill>
                             <a:schemeClr val="tx1"/>
                           </a:solidFill>
@@ -3795,7 +3781,7 @@
                     </a:p>
                     <a:p>
                       <a:r>
-                        <a:rPr lang="en-US" b="1" baseline="0" dirty="0" smtClean="0">
+                        <a:rPr lang="en-US" b="1" baseline="0" dirty="0">
                           <a:solidFill>
                             <a:schemeClr val="tx1"/>
                           </a:solidFill>
@@ -3805,7 +3791,7 @@
                     </a:p>
                     <a:p>
                       <a:r>
-                        <a:rPr lang="en-US" b="1" baseline="0" dirty="0" smtClean="0">
+                        <a:rPr lang="en-US" b="1" baseline="0" dirty="0">
                           <a:solidFill>
                             <a:schemeClr val="tx1"/>
                           </a:solidFill>
@@ -3856,11 +3842,11 @@
                         <a:defRPr/>
                       </a:pPr>
                       <a:r>
-                        <a:rPr lang="en-US" b="1" dirty="0" err="1" smtClean="0"/>
+                        <a:rPr lang="en-US" b="1" dirty="0" err="1"/>
                         <a:t>BigCluster</a:t>
                       </a:r>
                       <a:r>
-                        <a:rPr lang="en-US" b="1" dirty="0" smtClean="0"/>
+                        <a:rPr lang="en-US" b="1" dirty="0"/>
                         <a:t> 2 (Red)</a:t>
                       </a:r>
                     </a:p>
@@ -3883,7 +3869,7 @@
                         <a:defRPr/>
                       </a:pPr>
                       <a:r>
-                        <a:rPr lang="en-US" b="1" baseline="0" dirty="0" smtClean="0"/>
+                        <a:rPr lang="en-US" b="1" baseline="0" dirty="0"/>
                         <a:t>#TF=22</a:t>
                       </a:r>
                     </a:p>
@@ -3906,7 +3892,7 @@
                         <a:defRPr/>
                       </a:pPr>
                       <a:r>
-                        <a:rPr lang="en-US" b="1" baseline="0" dirty="0" smtClean="0"/>
+                        <a:rPr lang="en-US" b="1" baseline="0" dirty="0"/>
                         <a:t>#Clusters= 4 </a:t>
                       </a:r>
                     </a:p>
@@ -3953,23 +3939,23 @@
                         <a:defRPr/>
                       </a:pPr>
                       <a:r>
-                        <a:rPr lang="en-US" b="1" dirty="0" err="1" smtClean="0"/>
+                        <a:rPr lang="en-US" b="1" dirty="0" err="1"/>
                         <a:t>BigCluster</a:t>
                       </a:r>
                       <a:r>
-                        <a:rPr lang="en-US" b="1" dirty="0" smtClean="0"/>
+                        <a:rPr lang="en-US" b="1" dirty="0"/>
                         <a:t> 3 (Steel Green)</a:t>
                       </a:r>
                     </a:p>
                     <a:p>
                       <a:r>
-                        <a:rPr lang="en-US" b="1" baseline="0" dirty="0" smtClean="0"/>
+                        <a:rPr lang="en-US" b="1" baseline="0" dirty="0"/>
                         <a:t>#TF=377</a:t>
                       </a:r>
                     </a:p>
                     <a:p>
                       <a:r>
-                        <a:rPr lang="en-US" b="1" baseline="0" dirty="0" smtClean="0"/>
+                        <a:rPr lang="en-US" b="1" baseline="0" dirty="0"/>
                         <a:t>#Clusters= 18 </a:t>
                       </a:r>
                     </a:p>
@@ -4019,18 +4005,18 @@
                         <a:defRPr/>
                       </a:pPr>
                       <a:r>
-                        <a:rPr lang="en-US" b="1" dirty="0" err="1" smtClean="0"/>
+                        <a:rPr lang="en-US" b="1" dirty="0" err="1"/>
                         <a:t>BigCluster</a:t>
                       </a:r>
                       <a:r>
-                        <a:rPr lang="en-US" b="1" dirty="0" smtClean="0"/>
+                        <a:rPr lang="en-US" b="1" dirty="0"/>
                         <a:t> 4 (Purple)</a:t>
                       </a:r>
                       <a:br>
-                        <a:rPr lang="en-US" b="1" dirty="0" smtClean="0"/>
+                        <a:rPr lang="en-US" b="1" dirty="0"/>
                       </a:br>
                       <a:r>
-                        <a:rPr lang="en-US" b="1" baseline="0" dirty="0" smtClean="0"/>
+                        <a:rPr lang="en-US" b="1" baseline="0" dirty="0"/>
                         <a:t>#TF=37</a:t>
                       </a:r>
                     </a:p>
@@ -4053,7 +4039,7 @@
                         <a:defRPr/>
                       </a:pPr>
                       <a:r>
-                        <a:rPr lang="en-US" b="1" baseline="0" dirty="0" smtClean="0"/>
+                        <a:rPr lang="en-US" b="1" baseline="0" dirty="0"/>
                         <a:t>#Clusters= 4 </a:t>
                       </a:r>
                     </a:p>
@@ -4100,11 +4086,11 @@
                         <a:defRPr/>
                       </a:pPr>
                       <a:r>
-                        <a:rPr lang="en-US" b="1" dirty="0" err="1" smtClean="0"/>
+                        <a:rPr lang="en-US" b="1" dirty="0" err="1"/>
                         <a:t>BigCluster</a:t>
                       </a:r>
                       <a:r>
-                        <a:rPr lang="en-US" b="1" dirty="0" smtClean="0"/>
+                        <a:rPr lang="en-US" b="1" dirty="0"/>
                         <a:t> 5 (Yellow)</a:t>
                       </a:r>
                     </a:p>
@@ -4127,7 +4113,7 @@
                         <a:defRPr/>
                       </a:pPr>
                       <a:r>
-                        <a:rPr lang="en-US" b="1" baseline="0" dirty="0" smtClean="0"/>
+                        <a:rPr lang="en-US" b="1" baseline="0" dirty="0"/>
                         <a:t>#TF=22</a:t>
                       </a:r>
                     </a:p>
@@ -4150,7 +4136,7 @@
                         <a:defRPr/>
                       </a:pPr>
                       <a:r>
-                        <a:rPr lang="en-US" b="1" baseline="0" dirty="0" smtClean="0"/>
+                        <a:rPr lang="en-US" b="1" baseline="0" dirty="0"/>
                         <a:t>#Clusters= 21 </a:t>
                       </a:r>
                     </a:p>
@@ -4339,7 +4325,7 @@
         </p:blipFill>
         <p:spPr>
           <a:xfrm rot="5400000">
-            <a:off x="5401385" y="738480"/>
+            <a:off x="5401385" y="724192"/>
             <a:ext cx="6876965" cy="5485064"/>
           </a:xfrm>
           <a:prstGeom prst="rect">
@@ -4428,18 +4414,13 @@
                     <a:p>
                       <a:pPr algn="ctr"/>
                       <a:r>
-                        <a:rPr lang="en-US" sz="2000" b="1" dirty="0" smtClean="0">
+                        <a:rPr lang="en-US" sz="2000" b="1" dirty="0">
                           <a:solidFill>
                             <a:schemeClr val="bg1"/>
                           </a:solidFill>
                         </a:rPr>
                         <a:t>L1</a:t>
                       </a:r>
-                      <a:endParaRPr lang="en-US" sz="2000" b="1" dirty="0">
-                        <a:solidFill>
-                          <a:schemeClr val="bg1"/>
-                        </a:solidFill>
-                      </a:endParaRPr>
                     </a:p>
                   </a:txBody>
                   <a:tcPr anchor="ctr">
@@ -4455,18 +4436,13 @@
                     <a:p>
                       <a:pPr algn="ctr"/>
                       <a:r>
-                        <a:rPr lang="en-US" sz="2000" b="1" dirty="0" smtClean="0">
+                        <a:rPr lang="en-US" sz="2000" b="1" dirty="0">
                           <a:solidFill>
                             <a:schemeClr val="bg1"/>
                           </a:solidFill>
                         </a:rPr>
                         <a:t>L2</a:t>
                       </a:r>
-                      <a:endParaRPr lang="en-US" sz="2000" b="1" dirty="0">
-                        <a:solidFill>
-                          <a:schemeClr val="bg1"/>
-                        </a:solidFill>
-                      </a:endParaRPr>
                     </a:p>
                   </a:txBody>
                   <a:tcPr anchor="ctr">
@@ -4482,18 +4458,13 @@
                     <a:p>
                       <a:pPr algn="ctr"/>
                       <a:r>
-                        <a:rPr lang="en-US" sz="2000" b="1" dirty="0" smtClean="0">
+                        <a:rPr lang="en-US" sz="2000" b="1" dirty="0">
                           <a:solidFill>
                             <a:schemeClr val="bg1"/>
                           </a:solidFill>
                         </a:rPr>
                         <a:t>L3 +</a:t>
                       </a:r>
-                      <a:endParaRPr lang="en-US" sz="2000" b="1" dirty="0">
-                        <a:solidFill>
-                          <a:schemeClr val="bg1"/>
-                        </a:solidFill>
-                      </a:endParaRPr>
                     </a:p>
                   </a:txBody>
                   <a:tcPr anchor="ctr">
@@ -4520,7 +4491,7 @@
                         </a:lnSpc>
                       </a:pPr>
                       <a:r>
-                        <a:rPr lang="en-US" sz="1400" kern="1200" dirty="0" smtClean="0">
+                        <a:rPr lang="en-US" sz="1400" kern="1200" dirty="0">
                           <a:solidFill>
                             <a:schemeClr val="dk1"/>
                           </a:solidFill>
@@ -4553,7 +4524,7 @@
                         </a:lnSpc>
                       </a:pPr>
                       <a:r>
-                        <a:rPr lang="en-US" sz="1400" kern="1200" dirty="0" smtClean="0">
+                        <a:rPr lang="en-US" sz="1400" kern="1200" dirty="0">
                           <a:solidFill>
                             <a:schemeClr val="dk1"/>
                           </a:solidFill>
@@ -4598,11 +4569,11 @@
                         <a:defRPr/>
                       </a:pPr>
                       <a:r>
-                        <a:rPr lang="en-US" sz="1400" b="1" dirty="0" smtClean="0"/>
+                        <a:rPr lang="en-US" sz="1400" b="1" dirty="0"/>
                         <a:t>Infectious or Inflammatory disease </a:t>
                       </a:r>
                       <a:r>
-                        <a:rPr lang="en-US" sz="1400" b="1" dirty="0" smtClean="0">
+                        <a:rPr lang="en-US" sz="1400" b="1" dirty="0">
                           <a:solidFill>
                             <a:srgbClr val="0070C0"/>
                           </a:solidFill>
@@ -4610,7 +4581,7 @@
                         <a:t>(16):</a:t>
                       </a:r>
                       <a:r>
-                        <a:rPr lang="en-US" sz="1400" b="1" baseline="0" dirty="0" smtClean="0">
+                        <a:rPr lang="en-US" sz="1400" b="1" baseline="0" dirty="0">
                           <a:solidFill>
                             <a:srgbClr val="0070C0"/>
                           </a:solidFill>
@@ -4618,11 +4589,11 @@
                         <a:t> </a:t>
                       </a:r>
                       <a:r>
-                        <a:rPr lang="en-US" sz="1400" baseline="0" dirty="0" smtClean="0"/>
+                        <a:rPr lang="en-US" sz="1400" baseline="0" dirty="0"/>
                         <a:t>Infection (5), </a:t>
                       </a:r>
                       <a:r>
-                        <a:rPr lang="en-US" sz="1400" b="0" kern="1200" dirty="0" smtClean="0">
+                        <a:rPr lang="en-US" sz="1400" b="0" kern="1200" dirty="0">
                           <a:solidFill>
                             <a:schemeClr val="tx1"/>
                           </a:solidFill>
@@ -4653,7 +4624,7 @@
                         <a:defRPr/>
                       </a:pPr>
                       <a:r>
-                        <a:rPr lang="en-US" sz="1400" b="0" kern="1200" baseline="0" dirty="0" smtClean="0">
+                        <a:rPr lang="en-US" sz="1400" b="0" kern="1200" baseline="0" dirty="0">
                           <a:solidFill>
                             <a:schemeClr val="tx1"/>
                           </a:solidFill>
@@ -4684,11 +4655,11 @@
                         <a:defRPr/>
                       </a:pPr>
                       <a:r>
-                        <a:rPr lang="en-US" sz="1400" dirty="0" smtClean="0"/>
+                        <a:rPr lang="en-US" sz="1400" dirty="0"/>
                         <a:t>Enteritis</a:t>
                       </a:r>
                       <a:r>
-                        <a:rPr lang="en-US" sz="1400" baseline="0" dirty="0" smtClean="0"/>
+                        <a:rPr lang="en-US" sz="1400" baseline="0" dirty="0"/>
                         <a:t> (1)</a:t>
                       </a:r>
                     </a:p>
@@ -4711,7 +4682,7 @@
                         <a:defRPr/>
                       </a:pPr>
                       <a:r>
-                        <a:rPr lang="en-US" sz="1400" b="1" kern="1200" baseline="0" dirty="0" smtClean="0">
+                        <a:rPr lang="en-US" sz="1400" b="1" kern="1200" baseline="0" dirty="0">
                           <a:solidFill>
                             <a:schemeClr val="dk1"/>
                           </a:solidFill>
@@ -4723,7 +4694,7 @@
                         <a:t>Proliferation</a:t>
                       </a:r>
                       <a:r>
-                        <a:rPr lang="en-US" sz="1400" kern="1200" baseline="0" dirty="0" smtClean="0">
+                        <a:rPr lang="en-US" sz="1400" kern="1200" baseline="0" dirty="0">
                           <a:solidFill>
                             <a:schemeClr val="dk1"/>
                           </a:solidFill>
@@ -4735,7 +4706,7 @@
                         <a:t> </a:t>
                       </a:r>
                       <a:r>
-                        <a:rPr lang="en-US" sz="1400" b="1" kern="1200" baseline="0" dirty="0" smtClean="0">
+                        <a:rPr lang="en-US" sz="1400" b="1" kern="1200" baseline="0" dirty="0">
                           <a:solidFill>
                             <a:srgbClr val="0070C0"/>
                           </a:solidFill>
@@ -4747,7 +4718,7 @@
                         <a:t>(13): </a:t>
                       </a:r>
                       <a:r>
-                        <a:rPr lang="en-US" sz="1400" kern="1200" baseline="0" dirty="0" smtClean="0">
+                        <a:rPr lang="en-US" sz="1400" kern="1200" baseline="0" dirty="0">
                           <a:solidFill>
                             <a:schemeClr val="dk1"/>
                           </a:solidFill>
@@ -4778,7 +4749,7 @@
                         <a:defRPr/>
                       </a:pPr>
                       <a:r>
-                        <a:rPr lang="en-US" sz="1400" kern="1200" dirty="0" smtClean="0">
+                        <a:rPr lang="en-US" sz="1400" kern="1200" dirty="0">
                           <a:solidFill>
                             <a:schemeClr val="dk1"/>
                           </a:solidFill>
@@ -4790,13 +4761,13 @@
                         <a:t>          - Neuroepitheliomatous neoplasm</a:t>
                       </a:r>
                       <a:r>
-                        <a:rPr lang="en-US" sz="1400" dirty="0" smtClean="0">
+                        <a:rPr lang="en-US" sz="1400" dirty="0">
                           <a:effectLst/>
                         </a:rPr>
                         <a:t> </a:t>
                       </a:r>
                       <a:r>
-                        <a:rPr lang="en-US" sz="1400" kern="1200" baseline="0" dirty="0" smtClean="0">
+                        <a:rPr lang="en-US" sz="1400" kern="1200" baseline="0" dirty="0">
                           <a:solidFill>
                             <a:schemeClr val="dk1"/>
                           </a:solidFill>
@@ -4827,7 +4798,7 @@
                         <a:defRPr/>
                       </a:pPr>
                       <a:r>
-                        <a:rPr lang="en-US" sz="1400" b="0" kern="1200" baseline="0" dirty="0" smtClean="0">
+                        <a:rPr lang="en-US" sz="1400" b="0" kern="1200" baseline="0" dirty="0">
                           <a:solidFill>
                             <a:schemeClr val="tx1"/>
                           </a:solidFill>
@@ -4858,11 +4829,11 @@
                         <a:defRPr/>
                       </a:pPr>
                       <a:r>
-                        <a:rPr lang="en-US" sz="1400" b="0" dirty="0" err="1" smtClean="0"/>
+                        <a:rPr lang="en-US" sz="1400" b="0" dirty="0" err="1"/>
                         <a:t>Myomatous</a:t>
                       </a:r>
                       <a:r>
-                        <a:rPr lang="en-US" sz="1400" b="0" baseline="0" dirty="0" smtClean="0"/>
+                        <a:rPr lang="en-US" sz="1400" b="0" baseline="0" dirty="0"/>
                         <a:t> neoplasm (1)</a:t>
                       </a:r>
                     </a:p>
@@ -4885,23 +4856,23 @@
                         <a:defRPr/>
                       </a:pPr>
                       <a:r>
-                        <a:rPr lang="en-US" sz="1400" b="0" dirty="0" smtClean="0"/>
+                        <a:rPr lang="en-US" sz="1400" b="0" dirty="0"/>
                         <a:t>Germ</a:t>
                       </a:r>
                       <a:r>
-                        <a:rPr lang="en-US" sz="1400" b="0" baseline="0" dirty="0" smtClean="0"/>
+                        <a:rPr lang="en-US" sz="1400" b="0" baseline="0" dirty="0"/>
                         <a:t> cell neoplasm: </a:t>
                       </a:r>
                       <a:r>
-                        <a:rPr lang="en-US" sz="1400" dirty="0" smtClean="0"/>
+                        <a:rPr lang="en-US" sz="1400" dirty="0"/>
                         <a:t>Non-</a:t>
                       </a:r>
                       <a:r>
-                        <a:rPr lang="en-US" sz="1400" dirty="0" err="1" smtClean="0"/>
+                        <a:rPr lang="en-US" sz="1400" dirty="0" err="1"/>
                         <a:t>seminomatous</a:t>
                       </a:r>
                       <a:r>
-                        <a:rPr lang="en-US" sz="1400" dirty="0" smtClean="0"/>
+                        <a:rPr lang="en-US" sz="1400" dirty="0"/>
                         <a:t> germ cell tumor (1)</a:t>
                       </a:r>
                     </a:p>
@@ -4924,10 +4895,10 @@
                         <a:defRPr/>
                       </a:pPr>
                       <a:r>
-                        <a:rPr lang="en-US" sz="1400" dirty="0" smtClean="0"/>
+                        <a:rPr lang="en-US" sz="1400" dirty="0"/>
                         <a:t>Fatty neoplasm (1)</a:t>
                       </a:r>
-                      <a:endParaRPr lang="en-US" sz="1400" baseline="0" dirty="0" smtClean="0"/>
+                      <a:endParaRPr lang="en-US" sz="1400" baseline="0" dirty="0"/>
                     </a:p>
                     <a:p>
                       <a:pPr marL="171450" marR="0" indent="-171450" algn="ctr" defTabSz="914400" rtl="0" eaLnBrk="1" fontAlgn="auto" latinLnBrk="0" hangingPunct="1">
@@ -4948,7 +4919,7 @@
                         <a:defRPr/>
                       </a:pPr>
                       <a:r>
-                        <a:rPr lang="en-US" sz="1400" b="1" kern="1200" dirty="0" smtClean="0">
+                        <a:rPr lang="en-US" sz="1400" b="1" kern="1200" dirty="0">
                           <a:solidFill>
                             <a:schemeClr val="dk1"/>
                           </a:solidFill>
@@ -4960,7 +4931,7 @@
                         <a:t>Growth disorder</a:t>
                       </a:r>
                       <a:r>
-                        <a:rPr lang="en-US" sz="1400" dirty="0" smtClean="0">
+                        <a:rPr lang="en-US" sz="1400" dirty="0">
                           <a:solidFill>
                             <a:srgbClr val="0070C0"/>
                           </a:solidFill>
@@ -4969,7 +4940,7 @@
                         <a:t> (10):</a:t>
                       </a:r>
                       <a:r>
-                        <a:rPr lang="en-US" sz="1400" baseline="0" dirty="0" smtClean="0">
+                        <a:rPr lang="en-US" sz="1400" baseline="0" dirty="0">
                           <a:solidFill>
                             <a:srgbClr val="0070C0"/>
                           </a:solidFill>
@@ -4978,7 +4949,7 @@
                         <a:t> </a:t>
                       </a:r>
                       <a:r>
-                        <a:rPr lang="en-US" sz="1400" kern="1200" dirty="0" smtClean="0">
+                        <a:rPr lang="en-US" sz="1400" kern="1200" dirty="0">
                           <a:solidFill>
                             <a:schemeClr val="dk1"/>
                           </a:solidFill>
@@ -4990,13 +4961,13 @@
                         <a:t>Aplasia</a:t>
                       </a:r>
                       <a:r>
-                        <a:rPr lang="en-US" sz="1400" dirty="0" smtClean="0">
+                        <a:rPr lang="en-US" sz="1400" dirty="0">
                           <a:effectLst/>
                         </a:rPr>
                         <a:t> (3), </a:t>
                       </a:r>
                       <a:r>
-                        <a:rPr lang="en-US" sz="1400" kern="1200" baseline="0" dirty="0" smtClean="0">
+                        <a:rPr lang="en-US" sz="1400" kern="1200" baseline="0" dirty="0">
                           <a:solidFill>
                             <a:schemeClr val="dk1"/>
                           </a:solidFill>
@@ -5007,7 +4978,7 @@
                         </a:rPr>
                         <a:t>Dysplasia (1)</a:t>
                       </a:r>
-                      <a:endParaRPr lang="en-US" sz="1400" dirty="0" smtClean="0"/>
+                      <a:endParaRPr lang="en-US" sz="1400" dirty="0"/>
                     </a:p>
                     <a:p>
                       <a:pPr marL="171450" marR="0" indent="-171450" algn="ctr" defTabSz="914400" rtl="0" eaLnBrk="1" fontAlgn="auto" latinLnBrk="0" hangingPunct="1">
@@ -5028,11 +4999,11 @@
                         <a:defRPr/>
                       </a:pPr>
                       <a:r>
-                        <a:rPr lang="en-US" sz="1400" b="1" dirty="0" smtClean="0"/>
+                        <a:rPr lang="en-US" sz="1400" b="1" dirty="0"/>
                         <a:t>Mechanical disorder </a:t>
                       </a:r>
                       <a:r>
-                        <a:rPr lang="en-US" sz="1400" b="1" dirty="0" smtClean="0">
+                        <a:rPr lang="en-US" sz="1400" b="1" dirty="0">
                           <a:solidFill>
                             <a:srgbClr val="0070C0"/>
                           </a:solidFill>
@@ -5040,7 +5011,7 @@
                         <a:t>(10)</a:t>
                       </a:r>
                       <a:r>
-                        <a:rPr lang="en-US" sz="1400" b="1" baseline="0" dirty="0" smtClean="0">
+                        <a:rPr lang="en-US" sz="1400" b="1" baseline="0" dirty="0">
                           <a:solidFill>
                             <a:srgbClr val="0070C0"/>
                           </a:solidFill>
@@ -5048,11 +5019,11 @@
                         <a:t>: </a:t>
                       </a:r>
                       <a:r>
-                        <a:rPr lang="en-US" sz="1400" baseline="0" dirty="0" smtClean="0"/>
+                        <a:rPr lang="en-US" sz="1400" baseline="0" dirty="0"/>
                         <a:t>Flow disorder (5): </a:t>
                       </a:r>
                       <a:r>
-                        <a:rPr lang="en-US" sz="1400" kern="1200" dirty="0" smtClean="0">
+                        <a:rPr lang="en-US" sz="1400" kern="1200" dirty="0">
                           <a:solidFill>
                             <a:schemeClr val="dk1"/>
                           </a:solidFill>
@@ -5064,39 +5035,39 @@
                         <a:t>Hemorrhage</a:t>
                       </a:r>
                       <a:r>
-                        <a:rPr lang="en-US" sz="1400" dirty="0" smtClean="0">
+                        <a:rPr lang="en-US" sz="1400" dirty="0">
                           <a:effectLst/>
                         </a:rPr>
                         <a:t> (1),</a:t>
                       </a:r>
                       <a:r>
-                        <a:rPr lang="en-US" sz="1400" baseline="0" dirty="0" smtClean="0">
+                        <a:rPr lang="en-US" sz="1400" baseline="0" dirty="0">
                           <a:effectLst/>
                         </a:rPr>
                         <a:t> </a:t>
                       </a:r>
                       <a:r>
-                        <a:rPr lang="en-US" sz="1400" dirty="0" smtClean="0">
+                        <a:rPr lang="en-US" sz="1400" dirty="0">
                           <a:effectLst/>
                         </a:rPr>
                         <a:t> </a:t>
                       </a:r>
                       <a:r>
-                        <a:rPr lang="en-US" sz="1400" dirty="0" smtClean="0"/>
+                        <a:rPr lang="en-US" sz="1400" dirty="0"/>
                         <a:t>Disorder</a:t>
                       </a:r>
                       <a:r>
-                        <a:rPr lang="en-US" sz="1400" baseline="0" dirty="0" smtClean="0"/>
+                        <a:rPr lang="en-US" sz="1400" baseline="0" dirty="0"/>
                         <a:t> caused by drugs or toxins (1)</a:t>
                       </a:r>
                       <a:r>
-                        <a:rPr lang="en-US" sz="1400" baseline="0" dirty="0" smtClean="0">
+                        <a:rPr lang="en-US" sz="1400" baseline="0" dirty="0">
                           <a:effectLst/>
                         </a:rPr>
                         <a:t>, </a:t>
                       </a:r>
                       <a:r>
-                        <a:rPr lang="en-US" sz="1400" dirty="0" smtClean="0">
+                        <a:rPr lang="en-US" sz="1400" dirty="0">
                           <a:effectLst/>
                         </a:rPr>
                         <a:t>Displacement (2): </a:t>
@@ -5121,13 +5092,13 @@
                         <a:defRPr/>
                       </a:pPr>
                       <a:r>
-                        <a:rPr lang="en-US" sz="1400" dirty="0" smtClean="0">
+                        <a:rPr lang="en-US" sz="1400" dirty="0">
                           <a:effectLst/>
                         </a:rPr>
                         <a:t>Displaced</a:t>
                       </a:r>
                       <a:r>
-                        <a:rPr lang="en-US" sz="1400" baseline="0" dirty="0" smtClean="0">
+                        <a:rPr lang="en-US" sz="1400" baseline="0" dirty="0">
                           <a:effectLst/>
                         </a:rPr>
                         <a:t> Substance: Displaced gas (1)</a:t>
@@ -5152,7 +5123,7 @@
                         <a:defRPr/>
                       </a:pPr>
                       <a:r>
-                        <a:rPr lang="en-US" sz="1400" b="0" kern="1200" baseline="0" dirty="0" smtClean="0">
+                        <a:rPr lang="en-US" sz="1400" b="0" kern="1200" baseline="0" dirty="0">
                           <a:solidFill>
                             <a:schemeClr val="tx1"/>
                           </a:solidFill>
@@ -5183,7 +5154,7 @@
                         <a:defRPr/>
                       </a:pPr>
                       <a:r>
-                        <a:rPr lang="en-US" sz="1400" b="1" kern="1200" dirty="0" smtClean="0">
+                        <a:rPr lang="en-US" sz="1400" b="1" kern="1200" dirty="0">
                           <a:solidFill>
                             <a:schemeClr val="dk1"/>
                           </a:solidFill>
@@ -5195,7 +5166,7 @@
                         <a:t>Neoplastic disease:</a:t>
                       </a:r>
                       <a:r>
-                        <a:rPr lang="en-US" sz="1400" kern="1200" baseline="0" dirty="0" smtClean="0">
+                        <a:rPr lang="en-US" sz="1400" kern="1200" baseline="0" dirty="0">
                           <a:solidFill>
                             <a:schemeClr val="dk1"/>
                           </a:solidFill>
@@ -5207,7 +5178,7 @@
                         <a:t> malignant</a:t>
                       </a:r>
                       <a:r>
-                        <a:rPr lang="en-US" sz="1400" b="1" kern="1200" baseline="0" dirty="0" smtClean="0">
+                        <a:rPr lang="en-US" sz="1400" b="1" kern="1200" baseline="0" dirty="0">
                           <a:solidFill>
                             <a:srgbClr val="0070C0"/>
                           </a:solidFill>
@@ -5218,7 +5189,7 @@
                         </a:rPr>
                         <a:t> (8)</a:t>
                       </a:r>
-                      <a:endParaRPr lang="en-US" sz="1400" baseline="0" dirty="0" smtClean="0"/>
+                      <a:endParaRPr lang="en-US" sz="1400" baseline="0" dirty="0"/>
                     </a:p>
                     <a:p>
                       <a:pPr marL="171450" marR="0" indent="-171450" algn="ctr" defTabSz="914400" rtl="0" eaLnBrk="1" fontAlgn="auto" latinLnBrk="0" hangingPunct="1">
@@ -5239,7 +5210,7 @@
                         <a:defRPr/>
                       </a:pPr>
                       <a:r>
-                        <a:rPr lang="en-US" sz="1400" b="1" kern="1200" baseline="0" dirty="0" smtClean="0">
+                        <a:rPr lang="en-US" sz="1400" b="1" kern="1200" baseline="0" dirty="0">
                           <a:solidFill>
                             <a:schemeClr val="dk1"/>
                           </a:solidFill>
@@ -5251,7 +5222,7 @@
                         <a:t>Degenerative Disorder </a:t>
                       </a:r>
                       <a:r>
-                        <a:rPr lang="en-US" sz="1400" b="1" kern="1200" baseline="0" dirty="0" smtClean="0">
+                        <a:rPr lang="en-US" sz="1400" b="1" kern="1200" baseline="0" dirty="0">
                           <a:solidFill>
                             <a:srgbClr val="0070C0"/>
                           </a:solidFill>
@@ -5263,7 +5234,7 @@
                         <a:t>(6): </a:t>
                       </a:r>
                       <a:r>
-                        <a:rPr lang="en-US" sz="1400" b="0" dirty="0" smtClean="0">
+                        <a:rPr lang="en-US" sz="1400" b="0" dirty="0">
                           <a:solidFill>
                             <a:schemeClr val="tx1"/>
                           </a:solidFill>
@@ -5271,7 +5242,7 @@
                         <a:t>Deposition: </a:t>
                       </a:r>
                       <a:r>
-                        <a:rPr lang="en-US" sz="1400" b="0" kern="1200" dirty="0" smtClean="0">
+                        <a:rPr lang="en-US" sz="1400" b="0" kern="1200" dirty="0">
                           <a:solidFill>
                             <a:schemeClr val="tx1"/>
                           </a:solidFill>
@@ -5283,7 +5254,7 @@
                         <a:t>Mineral deposition disorder:</a:t>
                       </a:r>
                       <a:r>
-                        <a:rPr lang="en-US" sz="1400" b="0" kern="1200" baseline="0" dirty="0" smtClean="0">
+                        <a:rPr lang="en-US" sz="1400" b="0" kern="1200" baseline="0" dirty="0">
                           <a:solidFill>
                             <a:schemeClr val="tx1"/>
                           </a:solidFill>
@@ -5295,7 +5266,7 @@
                         <a:t> </a:t>
                       </a:r>
                       <a:r>
-                        <a:rPr lang="en-US" sz="1400" b="0" kern="1200" dirty="0" smtClean="0">
+                        <a:rPr lang="en-US" sz="1400" b="0" kern="1200" dirty="0">
                           <a:solidFill>
                             <a:schemeClr val="tx1"/>
                           </a:solidFill>
@@ -5307,7 +5278,7 @@
                         <a:t>Calcification disorder</a:t>
                       </a:r>
                       <a:r>
-                        <a:rPr lang="en-US" sz="1400" b="0" dirty="0" smtClean="0">
+                        <a:rPr lang="en-US" sz="1400" b="0" dirty="0">
                           <a:solidFill>
                             <a:schemeClr val="tx1"/>
                           </a:solidFill>
@@ -5315,7 +5286,7 @@
                         </a:rPr>
                         <a:t> (3)</a:t>
                       </a:r>
-                      <a:endParaRPr lang="en-US" sz="1400" kern="1200" baseline="0" dirty="0" smtClean="0">
+                      <a:endParaRPr lang="en-US" sz="1400" kern="1200" baseline="0" dirty="0">
                         <a:solidFill>
                           <a:schemeClr val="dk1"/>
                         </a:solidFill>
@@ -5344,7 +5315,7 @@
                         <a:defRPr/>
                       </a:pPr>
                       <a:r>
-                        <a:rPr lang="en-US" sz="1400" b="1" kern="1200" dirty="0" smtClean="0">
+                        <a:rPr lang="en-US" sz="1400" b="1" kern="1200" dirty="0">
                           <a:solidFill>
                             <a:schemeClr val="tx1"/>
                           </a:solidFill>
@@ -5356,7 +5327,7 @@
                         <a:t>Body-system-specific disorder </a:t>
                       </a:r>
                       <a:r>
-                        <a:rPr lang="en-US" sz="1400" b="1" kern="1200" dirty="0" smtClean="0">
+                        <a:rPr lang="en-US" sz="1400" b="1" kern="1200" dirty="0">
                           <a:solidFill>
                             <a:srgbClr val="0070C0"/>
                           </a:solidFill>
@@ -5368,7 +5339,7 @@
                         <a:t>(5)</a:t>
                       </a:r>
                       <a:r>
-                        <a:rPr lang="en-US" sz="1400" b="0" kern="1200" dirty="0" smtClean="0">
+                        <a:rPr lang="en-US" sz="1400" b="0" kern="1200" dirty="0">
                           <a:solidFill>
                             <a:srgbClr val="0070C0"/>
                           </a:solidFill>
@@ -5380,7 +5351,7 @@
                         <a:t>:</a:t>
                       </a:r>
                       <a:r>
-                        <a:rPr lang="en-US" sz="1400" b="0" kern="1200" baseline="0" dirty="0" smtClean="0">
+                        <a:rPr lang="en-US" sz="1400" b="0" kern="1200" baseline="0" dirty="0">
                           <a:solidFill>
                             <a:srgbClr val="0070C0"/>
                           </a:solidFill>
@@ -5392,7 +5363,7 @@
                         <a:t> </a:t>
                       </a:r>
                       <a:r>
-                        <a:rPr lang="en-US" sz="1400" b="0" kern="1200" baseline="0" dirty="0" smtClean="0">
+                        <a:rPr lang="en-US" sz="1400" b="0" kern="1200" baseline="0" dirty="0">
                           <a:solidFill>
                             <a:schemeClr val="tx1"/>
                           </a:solidFill>
@@ -5404,7 +5375,7 @@
                         <a:t>Bone disorder: Bone mineralization disorder: Demineralization (2), </a:t>
                       </a:r>
                       <a:r>
-                        <a:rPr lang="en-US" sz="1400" kern="1200" dirty="0" smtClean="0">
+                        <a:rPr lang="en-US" sz="1400" kern="1200" dirty="0">
                           <a:solidFill>
                             <a:schemeClr val="dk1"/>
                           </a:solidFill>
@@ -5416,7 +5387,7 @@
                         <a:t>Cardiovascular disorder</a:t>
                       </a:r>
                       <a:r>
-                        <a:rPr lang="en-US" sz="1400" kern="1200" baseline="0" dirty="0" smtClean="0">
+                        <a:rPr lang="en-US" sz="1400" kern="1200" baseline="0" dirty="0">
                           <a:solidFill>
                             <a:schemeClr val="dk1"/>
                           </a:solidFill>
@@ -5428,7 +5399,7 @@
                         <a:t> (3): </a:t>
                       </a:r>
                       <a:r>
-                        <a:rPr lang="en-US" sz="1400" kern="1200" dirty="0" smtClean="0">
+                        <a:rPr lang="en-US" sz="1400" kern="1200" dirty="0">
                           <a:solidFill>
                             <a:schemeClr val="dk1"/>
                           </a:solidFill>
@@ -5440,7 +5411,7 @@
                         <a:t>Heart disease </a:t>
                       </a:r>
                       <a:r>
-                        <a:rPr lang="en-US" sz="1400" b="0" kern="1200" dirty="0" smtClean="0">
+                        <a:rPr lang="en-US" sz="1400" b="0" kern="1200" dirty="0">
                           <a:solidFill>
                             <a:schemeClr val="dk1"/>
                           </a:solidFill>
@@ -5452,7 +5423,7 @@
                         <a:t>(2):</a:t>
                       </a:r>
                       <a:r>
-                        <a:rPr lang="en-US" sz="1400" b="0" kern="1200" baseline="0" dirty="0" smtClean="0">
+                        <a:rPr lang="en-US" sz="1400" b="0" kern="1200" baseline="0" dirty="0">
                           <a:solidFill>
                             <a:schemeClr val="dk1"/>
                           </a:solidFill>
@@ -5464,7 +5435,7 @@
                         <a:t> </a:t>
                       </a:r>
                       <a:r>
-                        <a:rPr lang="en-US" sz="1400" kern="1200" dirty="0" smtClean="0">
+                        <a:rPr lang="en-US" sz="1400" kern="1200" dirty="0">
                           <a:solidFill>
                             <a:schemeClr val="dk1"/>
                           </a:solidFill>
@@ -5476,12 +5447,12 @@
                         <a:t>Septal defect</a:t>
                       </a:r>
                       <a:r>
-                        <a:rPr lang="en-US" sz="1400" dirty="0" smtClean="0">
+                        <a:rPr lang="en-US" sz="1400" dirty="0">
                           <a:effectLst/>
                         </a:rPr>
                         <a:t> (1)</a:t>
                       </a:r>
-                      <a:endParaRPr lang="en-US" sz="1400" dirty="0" smtClean="0"/>
+                      <a:endParaRPr lang="en-US" sz="1400" dirty="0"/>
                     </a:p>
                     <a:p>
                       <a:pPr marL="171450" indent="-171450" algn="ctr">
@@ -5498,7 +5469,7 @@
                         <a:buChar char="§"/>
                       </a:pPr>
                       <a:r>
-                        <a:rPr lang="en-US" sz="1400" b="1" kern="1200" dirty="0" smtClean="0">
+                        <a:rPr lang="en-US" sz="1400" b="1" kern="1200" dirty="0">
                           <a:solidFill>
                             <a:schemeClr val="tx1"/>
                           </a:solidFill>
@@ -5510,7 +5481,7 @@
                         <a:t>Deficiency disorder</a:t>
                       </a:r>
                       <a:r>
-                        <a:rPr lang="en-US" sz="1400" b="1" dirty="0" smtClean="0">
+                        <a:rPr lang="en-US" sz="1400" b="1" dirty="0">
                           <a:solidFill>
                             <a:schemeClr val="tx1"/>
                           </a:solidFill>
@@ -5519,7 +5490,7 @@
                         <a:t> </a:t>
                       </a:r>
                       <a:r>
-                        <a:rPr lang="en-US" sz="1400" b="1" dirty="0" smtClean="0">
+                        <a:rPr lang="en-US" sz="1400" b="1" dirty="0">
                           <a:solidFill>
                             <a:srgbClr val="0070C0"/>
                           </a:solidFill>
@@ -5547,7 +5518,7 @@
                         <a:defRPr/>
                       </a:pPr>
                       <a:r>
-                        <a:rPr lang="en-US" sz="1400" b="1" kern="1200" baseline="0" dirty="0" smtClean="0">
+                        <a:rPr lang="en-US" sz="1400" b="1" kern="1200" baseline="0" dirty="0">
                           <a:solidFill>
                             <a:schemeClr val="tx1"/>
                           </a:solidFill>
@@ -5559,7 +5530,7 @@
                         <a:t>Metabolic Disease</a:t>
                       </a:r>
                       <a:r>
-                        <a:rPr lang="en-US" sz="1400" b="0" kern="1200" baseline="0" dirty="0" smtClean="0">
+                        <a:rPr lang="en-US" sz="1400" b="0" kern="1200" baseline="0" dirty="0">
                           <a:solidFill>
                             <a:schemeClr val="tx1"/>
                           </a:solidFill>
@@ -5571,7 +5542,7 @@
                         <a:t>: Metabolic bone disease </a:t>
                       </a:r>
                       <a:r>
-                        <a:rPr lang="en-US" sz="1400" b="1" kern="1200" baseline="0" dirty="0" smtClean="0">
+                        <a:rPr lang="en-US" sz="1400" b="1" kern="1200" baseline="0" dirty="0">
                           <a:solidFill>
                             <a:srgbClr val="0070C0"/>
                           </a:solidFill>
@@ -5582,7 +5553,7 @@
                         </a:rPr>
                         <a:t>(2)</a:t>
                       </a:r>
-                      <a:endParaRPr lang="en-US" sz="1400" b="0" kern="1200" baseline="0" dirty="0" smtClean="0">
+                      <a:endParaRPr lang="en-US" sz="1400" b="0" kern="1200" baseline="0" dirty="0">
                         <a:solidFill>
                           <a:schemeClr val="tx1"/>
                         </a:solidFill>
@@ -5610,7 +5581,7 @@
                         <a:tabLst/>
                         <a:defRPr/>
                       </a:pPr>
-                      <a:endParaRPr lang="en-US" sz="1400" b="0" dirty="0" smtClean="0">
+                      <a:endParaRPr lang="en-US" sz="1400" b="0" dirty="0">
                         <a:solidFill>
                           <a:schemeClr val="tx1"/>
                         </a:solidFill>
@@ -5670,7 +5641,7 @@
                         <a:defRPr/>
                       </a:pPr>
                       <a:r>
-                        <a:rPr lang="en-US" sz="1400" b="0" dirty="0" smtClean="0"/>
+                        <a:rPr lang="en-US" sz="1400" b="0" dirty="0"/>
                         <a:t>Symptom (1)</a:t>
                       </a:r>
                     </a:p>
@@ -5713,7 +5684,7 @@
                         <a:tabLst/>
                         <a:defRPr/>
                       </a:pPr>
-                      <a:endParaRPr lang="en-US" sz="1400" b="0" dirty="0" smtClean="0">
+                      <a:endParaRPr lang="en-US" sz="1400" b="0" dirty="0">
                         <a:solidFill>
                           <a:schemeClr val="tx1"/>
                         </a:solidFill>
@@ -5761,7 +5732,7 @@
           <a:p>
             <a:pPr algn="ctr"/>
             <a:r>
-              <a:rPr lang="en-US" b="1" dirty="0" smtClean="0">
+              <a:rPr lang="en-US" b="1" dirty="0">
                 <a:solidFill>
                   <a:schemeClr val="bg1"/>
                 </a:solidFill>
@@ -5769,12 +5740,8 @@
               <a:t>(</a:t>
             </a:r>
             <a:r>
-              <a:rPr lang="en-US" b="1" dirty="0" smtClean="0"/>
-              <a:t>Summary </a:t>
-            </a:r>
-            <a:r>
               <a:rPr lang="en-US" b="1" dirty="0"/>
-              <a:t>of top three most used RadLex terms across all 50 clusters)</a:t>
+              <a:t>Summary of top three most used RadLex terms across all 50 clusters)</a:t>
             </a:r>
           </a:p>
         </p:txBody>
@@ -5789,13 +5756,6 @@
   <p:clrMapOvr>
     <a:masterClrMapping/>
   </p:clrMapOvr>
-  <p:timing>
-    <p:tnLst>
-      <p:par>
-        <p:cTn id="1" dur="indefinite" restart="never" nodeType="tmRoot"/>
-      </p:par>
-    </p:tnLst>
-  </p:timing>
 </p:sld>
 </file>
 
@@ -5860,10 +5820,9 @@
                     <a:p>
                       <a:pPr algn="ctr"/>
                       <a:r>
-                        <a:rPr lang="en-US" dirty="0" smtClean="0"/>
+                        <a:rPr lang="en-US" dirty="0"/>
                         <a:t>L1</a:t>
                       </a:r>
-                      <a:endParaRPr lang="en-US" dirty="0"/>
                     </a:p>
                   </a:txBody>
                   <a:tcPr anchor="ctr"/>
@@ -5875,10 +5834,9 @@
                     <a:p>
                       <a:pPr algn="ctr"/>
                       <a:r>
-                        <a:rPr lang="en-US" dirty="0" smtClean="0"/>
+                        <a:rPr lang="en-US" dirty="0"/>
                         <a:t>L2 +</a:t>
                       </a:r>
-                      <a:endParaRPr lang="en-US" dirty="0"/>
                     </a:p>
                   </a:txBody>
                   <a:tcPr anchor="ctr"/>
@@ -5913,7 +5871,7 @@
                         <a:defRPr/>
                       </a:pPr>
                       <a:r>
-                        <a:rPr lang="en-US" sz="1400" kern="1200" dirty="0" smtClean="0">
+                        <a:rPr lang="en-US" sz="1400" kern="1200" dirty="0">
                           <a:solidFill>
                             <a:schemeClr val="dk1"/>
                           </a:solidFill>
@@ -5924,7 +5882,7 @@
                         </a:rPr>
                         <a:t>RadLex descriptor </a:t>
                       </a:r>
-                      <a:endParaRPr lang="en-US" sz="1400" b="0" dirty="0" smtClean="0"/>
+                      <a:endParaRPr lang="en-US" sz="1400" b="0" dirty="0"/>
                     </a:p>
                   </a:txBody>
                   <a:tcPr anchor="ctr" anchorCtr="1">
@@ -5946,7 +5904,7 @@
                         </a:lnSpc>
                       </a:pPr>
                       <a:r>
-                        <a:rPr lang="en-US" sz="1400" kern="1200" dirty="0" smtClean="0">
+                        <a:rPr lang="en-US" sz="1400" kern="1200" dirty="0">
                           <a:solidFill>
                             <a:schemeClr val="dk1"/>
                           </a:solidFill>
@@ -5965,7 +5923,7 @@
                         </a:lnSpc>
                       </a:pPr>
                       <a:r>
-                        <a:rPr lang="en-US" sz="1400" kern="1200" dirty="0" smtClean="0">
+                        <a:rPr lang="en-US" sz="1400" kern="1200" dirty="0">
                           <a:solidFill>
                             <a:schemeClr val="dk1"/>
                           </a:solidFill>
@@ -5977,7 +5935,7 @@
                         <a:t>Anatomically-related (6) Composition</a:t>
                       </a:r>
                       <a:r>
-                        <a:rPr lang="en-US" sz="1400" kern="1200" baseline="0" dirty="0" smtClean="0">
+                        <a:rPr lang="en-US" sz="1400" kern="1200" baseline="0" dirty="0">
                           <a:solidFill>
                             <a:schemeClr val="dk1"/>
                           </a:solidFill>
@@ -5996,7 +5954,7 @@
                         </a:lnSpc>
                       </a:pPr>
                       <a:r>
-                        <a:rPr lang="en-US" sz="1400" kern="1200" dirty="0" smtClean="0">
+                        <a:rPr lang="en-US" sz="1400" kern="1200" dirty="0">
                           <a:solidFill>
                             <a:schemeClr val="dk1"/>
                           </a:solidFill>
@@ -6015,7 +5973,7 @@
                         </a:lnSpc>
                       </a:pPr>
                       <a:r>
-                        <a:rPr lang="en-US" sz="1400" b="0" kern="1200" dirty="0" smtClean="0">
+                        <a:rPr lang="en-US" sz="1400" b="0" kern="1200" dirty="0">
                           <a:solidFill>
                             <a:schemeClr val="dk1"/>
                           </a:solidFill>
@@ -6034,7 +5992,7 @@
                         </a:lnSpc>
                       </a:pPr>
                       <a:r>
-                        <a:rPr lang="en-US" sz="1400" kern="1200" dirty="0" smtClean="0">
+                        <a:rPr lang="en-US" sz="1400" kern="1200" dirty="0">
                           <a:solidFill>
                             <a:schemeClr val="dk1"/>
                           </a:solidFill>
@@ -6053,7 +6011,7 @@
                         </a:lnSpc>
                       </a:pPr>
                       <a:r>
-                        <a:rPr lang="en-US" sz="1400" b="0" kern="1200" dirty="0" smtClean="0">
+                        <a:rPr lang="en-US" sz="1400" b="0" kern="1200" dirty="0">
                           <a:solidFill>
                             <a:schemeClr val="dk1"/>
                           </a:solidFill>
@@ -6065,7 +6023,7 @@
                         <a:t>Location</a:t>
                       </a:r>
                       <a:r>
-                        <a:rPr lang="en-US" sz="1400" b="0" kern="1200" baseline="0" dirty="0" smtClean="0">
+                        <a:rPr lang="en-US" sz="1400" b="0" kern="1200" baseline="0" dirty="0">
                           <a:solidFill>
                             <a:schemeClr val="dk1"/>
                           </a:solidFill>
@@ -6084,7 +6042,7 @@
                         </a:lnSpc>
                       </a:pPr>
                       <a:r>
-                        <a:rPr lang="en-US" sz="1400" b="0" kern="1200" baseline="0" dirty="0" smtClean="0">
+                        <a:rPr lang="en-US" sz="1400" b="0" kern="1200" baseline="0" dirty="0">
                           <a:solidFill>
                             <a:schemeClr val="dk1"/>
                           </a:solidFill>
@@ -6103,7 +6061,7 @@
                         </a:lnSpc>
                       </a:pPr>
                       <a:r>
-                        <a:rPr lang="en-US" sz="1400" b="0" kern="1200" baseline="0" dirty="0" smtClean="0">
+                        <a:rPr lang="en-US" sz="1400" b="0" kern="1200" baseline="0" dirty="0">
                           <a:solidFill>
                             <a:schemeClr val="dk1"/>
                           </a:solidFill>
@@ -6122,7 +6080,7 @@
                         </a:lnSpc>
                       </a:pPr>
                       <a:r>
-                        <a:rPr lang="en-US" sz="1400" b="0" kern="1200" dirty="0" smtClean="0">
+                        <a:rPr lang="en-US" sz="1400" b="0" kern="1200" dirty="0">
                           <a:solidFill>
                             <a:schemeClr val="dk1"/>
                           </a:solidFill>
@@ -6141,7 +6099,7 @@
                         </a:lnSpc>
                       </a:pPr>
                       <a:r>
-                        <a:rPr lang="en-US" sz="1400" b="0" kern="1200" dirty="0" smtClean="0">
+                        <a:rPr lang="en-US" sz="1400" b="0" kern="1200" dirty="0">
                           <a:solidFill>
                             <a:schemeClr val="dk1"/>
                           </a:solidFill>
@@ -6153,7 +6111,7 @@
                         <a:t>Temporal</a:t>
                       </a:r>
                       <a:r>
-                        <a:rPr lang="en-US" sz="1400" b="0" kern="1200" baseline="0" dirty="0" smtClean="0">
+                        <a:rPr lang="en-US" sz="1400" b="0" kern="1200" baseline="0" dirty="0">
                           <a:solidFill>
                             <a:schemeClr val="dk1"/>
                           </a:solidFill>
@@ -6172,7 +6130,7 @@
                         </a:lnSpc>
                       </a:pPr>
                       <a:r>
-                        <a:rPr lang="en-US" sz="1400" b="0" kern="1200" dirty="0" smtClean="0">
+                        <a:rPr lang="en-US" sz="1400" b="0" kern="1200" dirty="0">
                           <a:solidFill>
                             <a:schemeClr val="dk1"/>
                           </a:solidFill>
@@ -6184,7 +6142,7 @@
                         <a:t>Pathophysiologic process descriptor:</a:t>
                       </a:r>
                       <a:r>
-                        <a:rPr lang="en-US" sz="1400" b="0" kern="1200" baseline="0" dirty="0" smtClean="0">
+                        <a:rPr lang="en-US" sz="1400" b="0" kern="1200" baseline="0" dirty="0">
                           <a:solidFill>
                             <a:schemeClr val="dk1"/>
                           </a:solidFill>
@@ -6203,7 +6161,7 @@
                         </a:lnSpc>
                       </a:pPr>
                       <a:r>
-                        <a:rPr lang="en-US" sz="1400" b="0" kern="1200" baseline="0" dirty="0" smtClean="0">
+                        <a:rPr lang="en-US" sz="1400" b="0" kern="1200" baseline="0" dirty="0">
                           <a:solidFill>
                             <a:schemeClr val="dk1"/>
                           </a:solidFill>
@@ -6222,7 +6180,7 @@
                         </a:lnSpc>
                       </a:pPr>
                       <a:r>
-                        <a:rPr lang="en-US" sz="1400" b="0" kern="1200" baseline="0" dirty="0" smtClean="0">
+                        <a:rPr lang="en-US" sz="1400" b="0" kern="1200" baseline="0" dirty="0">
                           <a:solidFill>
                             <a:schemeClr val="dk1"/>
                           </a:solidFill>
@@ -6241,7 +6199,7 @@
                         </a:lnSpc>
                       </a:pPr>
                       <a:r>
-                        <a:rPr lang="en-US" sz="1400" b="0" kern="1200" baseline="0" dirty="0" smtClean="0">
+                        <a:rPr lang="en-US" sz="1400" b="0" kern="1200" baseline="0" dirty="0">
                           <a:solidFill>
                             <a:schemeClr val="dk1"/>
                           </a:solidFill>
@@ -6260,7 +6218,7 @@
                         </a:lnSpc>
                       </a:pPr>
                       <a:r>
-                        <a:rPr lang="en-US" sz="1400" b="0" kern="1200" baseline="0" dirty="0" smtClean="0">
+                        <a:rPr lang="en-US" sz="1400" b="0" kern="1200" baseline="0" dirty="0">
                           <a:solidFill>
                             <a:schemeClr val="dk1"/>
                           </a:solidFill>
@@ -6278,7 +6236,7 @@
                           <a:spcPct val="100000"/>
                         </a:lnSpc>
                       </a:pPr>
-                      <a:endParaRPr lang="en-US" sz="1400" b="0" kern="1200" baseline="0" dirty="0" smtClean="0">
+                      <a:endParaRPr lang="en-US" sz="1400" b="0" kern="1200" baseline="0" dirty="0">
                         <a:solidFill>
                           <a:schemeClr val="dk1"/>
                         </a:solidFill>
@@ -6317,13 +6275,6 @@
   <p:clrMapOvr>
     <a:masterClrMapping/>
   </p:clrMapOvr>
-  <p:timing>
-    <p:tnLst>
-      <p:par>
-        <p:cTn id="1" dur="indefinite" restart="never" nodeType="tmRoot"/>
-      </p:par>
-    </p:tnLst>
-  </p:timing>
 </p:sld>
 </file>
 
@@ -6402,10 +6353,9 @@
                     <a:p>
                       <a:pPr algn="ctr"/>
                       <a:r>
-                        <a:rPr lang="en-US" dirty="0" smtClean="0"/>
+                        <a:rPr lang="en-US" dirty="0"/>
                         <a:t>L1</a:t>
                       </a:r>
-                      <a:endParaRPr lang="en-US" dirty="0"/>
                     </a:p>
                   </a:txBody>
                   <a:tcPr anchor="ctr"/>
@@ -6417,10 +6367,9 @@
                     <a:p>
                       <a:pPr algn="ctr"/>
                       <a:r>
-                        <a:rPr lang="en-US" dirty="0" smtClean="0"/>
+                        <a:rPr lang="en-US" dirty="0"/>
                         <a:t>L2</a:t>
                       </a:r>
-                      <a:endParaRPr lang="en-US" dirty="0"/>
                     </a:p>
                   </a:txBody>
                   <a:tcPr anchor="ctr"/>
@@ -6432,10 +6381,9 @@
                     <a:p>
                       <a:pPr algn="ctr"/>
                       <a:r>
-                        <a:rPr lang="en-US" dirty="0" smtClean="0"/>
+                        <a:rPr lang="en-US" dirty="0"/>
                         <a:t>L3</a:t>
                       </a:r>
-                      <a:endParaRPr lang="en-US" dirty="0"/>
                     </a:p>
                   </a:txBody>
                   <a:tcPr anchor="ctr"/>
@@ -6447,10 +6395,9 @@
                     <a:p>
                       <a:pPr algn="ctr"/>
                       <a:r>
-                        <a:rPr lang="en-US" dirty="0" smtClean="0"/>
+                        <a:rPr lang="en-US" dirty="0"/>
                         <a:t>L4 +</a:t>
                       </a:r>
-                      <a:endParaRPr lang="en-US" dirty="0"/>
                     </a:p>
                   </a:txBody>
                   <a:tcPr anchor="ctr"/>
@@ -6485,7 +6432,7 @@
                         <a:defRPr/>
                       </a:pPr>
                       <a:r>
-                        <a:rPr lang="en-US" sz="1400" dirty="0" smtClean="0"/>
+                        <a:rPr lang="en-US" sz="1400" dirty="0"/>
                         <a:t>Anatomical Entity</a:t>
                       </a:r>
                     </a:p>
@@ -6521,7 +6468,7 @@
                         <a:defRPr/>
                       </a:pPr>
                       <a:r>
-                        <a:rPr lang="en-US" sz="1400" kern="1200" dirty="0" smtClean="0">
+                        <a:rPr lang="en-US" sz="1400" kern="1200" dirty="0">
                           <a:solidFill>
                             <a:schemeClr val="dk1"/>
                           </a:solidFill>
@@ -6532,7 +6479,7 @@
                         </a:rPr>
                         <a:t>Material anatomical entity </a:t>
                       </a:r>
-                      <a:endParaRPr lang="en-US" sz="1400" dirty="0" smtClean="0"/>
+                      <a:endParaRPr lang="en-US" sz="1400" dirty="0"/>
                     </a:p>
                   </a:txBody>
                   <a:tcPr anchor="ctr" anchorCtr="1">
@@ -6566,7 +6513,7 @@
                         <a:defRPr/>
                       </a:pPr>
                       <a:r>
-                        <a:rPr lang="en-US" sz="1400" kern="1200" dirty="0" smtClean="0">
+                        <a:rPr lang="en-US" sz="1400" kern="1200" dirty="0">
                           <a:solidFill>
                             <a:schemeClr val="dk1"/>
                           </a:solidFill>
@@ -6577,7 +6524,7 @@
                         </a:rPr>
                         <a:t>Anatomical structure </a:t>
                       </a:r>
-                      <a:endParaRPr lang="en-US" sz="1400" dirty="0" smtClean="0"/>
+                      <a:endParaRPr lang="en-US" sz="1400" dirty="0"/>
                     </a:p>
                   </a:txBody>
                   <a:tcPr anchor="ctr" anchorCtr="1">
@@ -6611,7 +6558,7 @@
                         <a:defRPr/>
                       </a:pPr>
                       <a:r>
-                        <a:rPr lang="en-US" sz="1400" b="1" kern="1200" dirty="0" smtClean="0">
+                        <a:rPr lang="en-US" sz="1400" b="1" kern="1200" dirty="0">
                           <a:solidFill>
                             <a:schemeClr val="dk1"/>
                           </a:solidFill>
@@ -6623,7 +6570,7 @@
                         <a:t>Organ (5):</a:t>
                       </a:r>
                       <a:r>
-                        <a:rPr lang="en-US" sz="1400" b="1" kern="1200" baseline="0" dirty="0" smtClean="0">
+                        <a:rPr lang="en-US" sz="1400" b="1" kern="1200" baseline="0" dirty="0">
                           <a:solidFill>
                             <a:schemeClr val="dk1"/>
                           </a:solidFill>
@@ -6635,7 +6582,7 @@
                         <a:t> </a:t>
                       </a:r>
                       <a:r>
-                        <a:rPr lang="en-US" sz="1400" kern="1200" dirty="0" smtClean="0">
+                        <a:rPr lang="en-US" sz="1400" kern="1200" dirty="0">
                           <a:solidFill>
                             <a:schemeClr val="dk1"/>
                           </a:solidFill>
@@ -6647,19 +6594,19 @@
                         <a:t>Cavitated organ (3): Organ with organ cavity</a:t>
                       </a:r>
                       <a:r>
-                        <a:rPr lang="en-US" sz="1400" dirty="0" smtClean="0">
+                        <a:rPr lang="en-US" sz="1400" dirty="0">
                           <a:effectLst/>
                         </a:rPr>
                         <a:t> (1), </a:t>
                       </a:r>
                       <a:r>
-                        <a:rPr lang="en-US" sz="1400" baseline="0" dirty="0" smtClean="0">
+                        <a:rPr lang="en-US" sz="1400" baseline="0" dirty="0">
                           <a:effectLst/>
                         </a:rPr>
                         <a:t> </a:t>
                       </a:r>
                       <a:r>
-                        <a:rPr lang="en-US" sz="1400" kern="1200" dirty="0" smtClean="0">
+                        <a:rPr lang="en-US" sz="1400" kern="1200" dirty="0">
                           <a:solidFill>
                             <a:schemeClr val="dk1"/>
                           </a:solidFill>
@@ -6671,7 +6618,7 @@
                         <a:t>Organ with </a:t>
                       </a:r>
                       <a:r>
-                        <a:rPr lang="en-US" sz="1400" kern="1200" dirty="0" err="1" smtClean="0">
+                        <a:rPr lang="en-US" sz="1400" kern="1200" dirty="0" err="1">
                           <a:solidFill>
                             <a:schemeClr val="dk1"/>
                           </a:solidFill>
@@ -6683,7 +6630,7 @@
                         <a:t>cavitated</a:t>
                       </a:r>
                       <a:r>
-                        <a:rPr lang="en-US" sz="1400" kern="1200" dirty="0" smtClean="0">
+                        <a:rPr lang="en-US" sz="1400" kern="1200" dirty="0">
                           <a:solidFill>
                             <a:schemeClr val="dk1"/>
                           </a:solidFill>
@@ -6695,7 +6642,7 @@
                         <a:t> organ parts (2):</a:t>
                       </a:r>
                       <a:r>
-                        <a:rPr lang="en-US" sz="1400" kern="1200" baseline="0" dirty="0" smtClean="0">
+                        <a:rPr lang="en-US" sz="1400" kern="1200" baseline="0" dirty="0">
                           <a:solidFill>
                             <a:schemeClr val="dk1"/>
                           </a:solidFill>
@@ -6707,7 +6654,7 @@
                         <a:t> </a:t>
                       </a:r>
                       <a:r>
-                        <a:rPr lang="en-US" sz="1400" kern="1200" dirty="0" smtClean="0">
+                        <a:rPr lang="en-US" sz="1400" kern="1200" dirty="0">
                           <a:solidFill>
                             <a:schemeClr val="dk1"/>
                           </a:solidFill>
@@ -6738,7 +6685,7 @@
                         <a:defRPr/>
                       </a:pPr>
                       <a:r>
-                        <a:rPr lang="en-US" sz="1400" kern="1200" dirty="0" smtClean="0">
+                        <a:rPr lang="en-US" sz="1400" kern="1200" dirty="0">
                           <a:solidFill>
                             <a:schemeClr val="dk1"/>
                           </a:solidFill>
@@ -6750,13 +6697,13 @@
                         <a:t>- Short bone: Tarsal bone</a:t>
                       </a:r>
                       <a:r>
-                        <a:rPr lang="en-US" sz="1400" dirty="0" smtClean="0">
+                        <a:rPr lang="en-US" sz="1400" dirty="0">
                           <a:effectLst/>
                         </a:rPr>
                         <a:t> (1)</a:t>
                       </a:r>
                       <a:r>
-                        <a:rPr lang="en-US" sz="1400" kern="1200" dirty="0" smtClean="0">
+                        <a:rPr lang="en-US" sz="1400" kern="1200" dirty="0">
                           <a:solidFill>
                             <a:schemeClr val="dk1"/>
                           </a:solidFill>
@@ -6787,11 +6734,11 @@
                         <a:defRPr/>
                       </a:pPr>
                       <a:r>
-                        <a:rPr lang="en-US" sz="1400" dirty="0" smtClean="0"/>
+                        <a:rPr lang="en-US" sz="1400" dirty="0"/>
                         <a:t>- Long bone</a:t>
                       </a:r>
                       <a:r>
-                        <a:rPr lang="en-US" sz="1400" baseline="0" dirty="0" smtClean="0"/>
+                        <a:rPr lang="en-US" sz="1400" baseline="0" dirty="0"/>
                         <a:t> (1)</a:t>
                       </a:r>
                     </a:p>
@@ -6813,7 +6760,7 @@
                         <a:tabLst/>
                         <a:defRPr/>
                       </a:pPr>
-                      <a:endParaRPr lang="en-US" sz="1400" baseline="0" dirty="0" smtClean="0"/>
+                      <a:endParaRPr lang="en-US" sz="1400" baseline="0" dirty="0"/>
                     </a:p>
                     <a:p>
                       <a:pPr marL="171450" marR="0" indent="-171450" algn="ctr" defTabSz="914400" rtl="0" eaLnBrk="1" fontAlgn="auto" latinLnBrk="0" hangingPunct="1">
@@ -6834,15 +6781,15 @@
                         <a:defRPr/>
                       </a:pPr>
                       <a:r>
-                        <a:rPr lang="en-US" sz="1400" b="1" dirty="0" smtClean="0"/>
+                        <a:rPr lang="en-US" sz="1400" b="1" dirty="0"/>
                         <a:t>Solid organ:</a:t>
                       </a:r>
                       <a:r>
-                        <a:rPr lang="en-US" sz="1400" b="1" baseline="0" dirty="0" smtClean="0"/>
+                        <a:rPr lang="en-US" sz="1400" b="1" baseline="0" dirty="0"/>
                         <a:t> </a:t>
                       </a:r>
                       <a:r>
-                        <a:rPr lang="en-US" sz="1400" b="1" kern="1200" dirty="0" smtClean="0">
+                        <a:rPr lang="en-US" sz="1400" b="1" kern="1200" dirty="0">
                           <a:solidFill>
                             <a:schemeClr val="dk1"/>
                           </a:solidFill>
@@ -6854,15 +6801,15 @@
                         <a:t> </a:t>
                       </a:r>
                       <a:r>
-                        <a:rPr lang="en-US" sz="1400" dirty="0" err="1" smtClean="0"/>
+                        <a:rPr lang="en-US" sz="1400" dirty="0" err="1"/>
                         <a:t>Parenchymatous</a:t>
                       </a:r>
                       <a:r>
-                        <a:rPr lang="en-US" sz="1400" dirty="0" smtClean="0"/>
+                        <a:rPr lang="en-US" sz="1400" dirty="0"/>
                         <a:t> organ (2): </a:t>
                       </a:r>
                       <a:r>
-                        <a:rPr lang="en-US" sz="1400" kern="1200" dirty="0" smtClean="0">
+                        <a:rPr lang="en-US" sz="1400" kern="1200" dirty="0">
                           <a:solidFill>
                             <a:schemeClr val="dk1"/>
                           </a:solidFill>
@@ -6874,7 +6821,7 @@
                         <a:t>Lobular organ</a:t>
                       </a:r>
                       <a:r>
-                        <a:rPr lang="en-US" sz="1400" dirty="0" smtClean="0">
+                        <a:rPr lang="en-US" sz="1400" dirty="0">
                           <a:effectLst/>
                         </a:rPr>
                         <a:t> (1)</a:t>
@@ -6898,7 +6845,7 @@
                         <a:tabLst/>
                         <a:defRPr/>
                       </a:pPr>
-                      <a:endParaRPr lang="en-US" sz="1400" dirty="0" smtClean="0">
+                      <a:endParaRPr lang="en-US" sz="1400" dirty="0">
                         <a:effectLst/>
                       </a:endParaRPr>
                     </a:p>
@@ -6921,7 +6868,7 @@
                         <a:defRPr/>
                       </a:pPr>
                       <a:r>
-                        <a:rPr lang="en-US" sz="1400" b="1" dirty="0" smtClean="0"/>
+                        <a:rPr lang="en-US" sz="1400" b="1" dirty="0"/>
                         <a:t>Cell (1)</a:t>
                       </a:r>
                     </a:p>
@@ -6943,7 +6890,7 @@
                         <a:tabLst/>
                         <a:defRPr/>
                       </a:pPr>
-                      <a:endParaRPr lang="en-US" sz="1400" dirty="0" smtClean="0"/>
+                      <a:endParaRPr lang="en-US" sz="1400" dirty="0"/>
                     </a:p>
                     <a:p>
                       <a:pPr marL="171450" marR="0" indent="-171450" algn="ctr" defTabSz="914400" rtl="0" eaLnBrk="1" fontAlgn="auto" latinLnBrk="0" hangingPunct="1">
@@ -6964,7 +6911,7 @@
                         <a:defRPr/>
                       </a:pPr>
                       <a:r>
-                        <a:rPr lang="en-US" sz="1400" b="1" kern="1200" dirty="0" smtClean="0">
+                        <a:rPr lang="en-US" sz="1400" b="1" kern="1200" dirty="0">
                           <a:solidFill>
                             <a:schemeClr val="dk1"/>
                           </a:solidFill>
@@ -6976,7 +6923,7 @@
                         <a:t>Anatomic sub-part</a:t>
                       </a:r>
                       <a:r>
-                        <a:rPr lang="en-US" sz="1400" b="1" dirty="0" smtClean="0">
+                        <a:rPr lang="en-US" sz="1400" b="1" dirty="0">
                           <a:effectLst/>
                         </a:rPr>
                         <a:t> (1)</a:t>
@@ -7000,7 +6947,7 @@
                         <a:tabLst/>
                         <a:defRPr/>
                       </a:pPr>
-                      <a:endParaRPr lang="en-US" sz="1400" b="1" dirty="0" smtClean="0"/>
+                      <a:endParaRPr lang="en-US" sz="1400" b="1" dirty="0"/>
                     </a:p>
                     <a:p>
                       <a:pPr marL="171450" marR="0" indent="-171450" algn="ctr" defTabSz="914400" rtl="0" eaLnBrk="1" fontAlgn="auto" latinLnBrk="0" hangingPunct="1">
@@ -7021,7 +6968,7 @@
                         <a:defRPr/>
                       </a:pPr>
                       <a:r>
-                        <a:rPr lang="en-US" sz="1400" b="1" kern="1200" dirty="0" smtClean="0">
+                        <a:rPr lang="en-US" sz="1400" b="1" kern="1200" dirty="0">
                           <a:solidFill>
                             <a:schemeClr val="dk1"/>
                           </a:solidFill>
@@ -7033,7 +6980,7 @@
                         <a:t>Anatomical cluster (2):</a:t>
                       </a:r>
                       <a:r>
-                        <a:rPr lang="en-US" sz="1400" b="1" kern="1200" baseline="0" dirty="0" smtClean="0">
+                        <a:rPr lang="en-US" sz="1400" b="1" kern="1200" baseline="0" dirty="0">
                           <a:solidFill>
                             <a:schemeClr val="dk1"/>
                           </a:solidFill>
@@ -7045,7 +6992,7 @@
                         <a:t>  </a:t>
                       </a:r>
                       <a:r>
-                        <a:rPr lang="en-US" sz="1400" kern="1200" dirty="0" smtClean="0">
+                        <a:rPr lang="en-US" sz="1400" kern="1200" dirty="0">
                           <a:solidFill>
                             <a:schemeClr val="dk1"/>
                           </a:solidFill>
@@ -7057,7 +7004,7 @@
                         <a:t>Cell part cluster:</a:t>
                       </a:r>
                       <a:r>
-                        <a:rPr lang="en-US" sz="1400" kern="1200" baseline="0" dirty="0" smtClean="0">
+                        <a:rPr lang="en-US" sz="1400" kern="1200" baseline="0" dirty="0">
                           <a:solidFill>
                             <a:schemeClr val="dk1"/>
                           </a:solidFill>
@@ -7069,7 +7016,7 @@
                         <a:t> </a:t>
                       </a:r>
                       <a:r>
-                        <a:rPr lang="en-US" sz="1400" kern="1200" dirty="0" smtClean="0">
+                        <a:rPr lang="en-US" sz="1400" kern="1200" dirty="0">
                           <a:solidFill>
                             <a:schemeClr val="dk1"/>
                           </a:solidFill>
@@ -7081,25 +7028,25 @@
                         <a:t>Segment of neural tree organ</a:t>
                       </a:r>
                       <a:r>
-                        <a:rPr lang="en-US" sz="1400" dirty="0" smtClean="0">
+                        <a:rPr lang="en-US" sz="1400" dirty="0">
                           <a:effectLst/>
                         </a:rPr>
                         <a:t> </a:t>
                       </a:r>
                       <a:r>
-                        <a:rPr lang="en-US" sz="1400" b="1" dirty="0" smtClean="0">
+                        <a:rPr lang="en-US" sz="1400" b="1" dirty="0">
                           <a:effectLst/>
                         </a:rPr>
                         <a:t>(1),</a:t>
                       </a:r>
                       <a:r>
-                        <a:rPr lang="en-US" sz="1400" b="1" baseline="0" dirty="0" smtClean="0">
+                        <a:rPr lang="en-US" sz="1400" b="1" baseline="0" dirty="0">
                           <a:effectLst/>
                         </a:rPr>
                         <a:t> </a:t>
                       </a:r>
                       <a:r>
-                        <a:rPr lang="en-US" sz="1400" kern="1200" dirty="0" smtClean="0">
+                        <a:rPr lang="en-US" sz="1400" kern="1200" dirty="0">
                           <a:solidFill>
                             <a:schemeClr val="dk1"/>
                           </a:solidFill>
@@ -7111,12 +7058,12 @@
                         <a:t>Heterogeneous anatomical cluster: Subdivision of pharynx</a:t>
                       </a:r>
                       <a:r>
-                        <a:rPr lang="en-US" sz="1400" dirty="0" smtClean="0">
+                        <a:rPr lang="en-US" sz="1400" dirty="0">
                           <a:effectLst/>
                         </a:rPr>
                         <a:t> (1)</a:t>
                       </a:r>
-                      <a:endParaRPr lang="en-US" sz="1400" dirty="0" smtClean="0"/>
+                      <a:endParaRPr lang="en-US" sz="1400" dirty="0"/>
                     </a:p>
                     <a:p>
                       <a:pPr marL="0" marR="0" indent="0" algn="ctr" defTabSz="914400" rtl="0" eaLnBrk="1" fontAlgn="auto" latinLnBrk="0" hangingPunct="1">
@@ -7136,7 +7083,7 @@
                         <a:tabLst/>
                         <a:defRPr/>
                       </a:pPr>
-                      <a:endParaRPr lang="en-US" sz="1400" b="1" dirty="0" smtClean="0"/>
+                      <a:endParaRPr lang="en-US" sz="1400" b="1" dirty="0"/>
                     </a:p>
                     <a:p>
                       <a:pPr marL="0" marR="0" indent="0" algn="ctr" defTabSz="914400" rtl="0" eaLnBrk="1" fontAlgn="auto" latinLnBrk="0" hangingPunct="1">
@@ -7156,7 +7103,7 @@
                         <a:tabLst/>
                         <a:defRPr/>
                       </a:pPr>
-                      <a:endParaRPr lang="en-US" sz="1400" dirty="0" smtClean="0"/>
+                      <a:endParaRPr lang="en-US" sz="1400" dirty="0"/>
                     </a:p>
                   </a:txBody>
                   <a:tcPr anchor="ctr" anchorCtr="1">
@@ -7196,7 +7143,7 @@
                         <a:tabLst/>
                         <a:defRPr/>
                       </a:pPr>
-                      <a:endParaRPr lang="en-US" sz="1100" dirty="0" smtClean="0"/>
+                      <a:endParaRPr lang="en-US" sz="1100" dirty="0"/>
                     </a:p>
                   </a:txBody>
                   <a:tcPr anchor="ctr" anchorCtr="1"/>
@@ -7227,11 +7174,11 @@
                         </a:lnSpc>
                       </a:pPr>
                       <a:r>
-                        <a:rPr lang="en-US" sz="1400" dirty="0" smtClean="0"/>
+                        <a:rPr lang="en-US" sz="1400" dirty="0"/>
                         <a:t>Portion of body</a:t>
                       </a:r>
                       <a:r>
-                        <a:rPr lang="en-US" sz="1400" baseline="0" dirty="0" smtClean="0"/>
+                        <a:rPr lang="en-US" sz="1400" baseline="0" dirty="0"/>
                         <a:t> substance</a:t>
                       </a:r>
                       <a:endParaRPr lang="en-US" sz="1400" dirty="0"/>
@@ -7256,11 +7203,11 @@
                         </a:lnSpc>
                       </a:pPr>
                       <a:r>
-                        <a:rPr lang="en-US" sz="1400" b="1" dirty="0" smtClean="0"/>
+                        <a:rPr lang="en-US" sz="1400" b="1" dirty="0"/>
                         <a:t>Portion</a:t>
                       </a:r>
                       <a:r>
-                        <a:rPr lang="en-US" sz="1400" b="1" baseline="0" dirty="0" smtClean="0"/>
+                        <a:rPr lang="en-US" sz="1400" b="1" baseline="0" dirty="0"/>
                         <a:t> of body fluid (1)</a:t>
                       </a:r>
                       <a:endParaRPr lang="en-US" sz="1400" b="1" dirty="0"/>
@@ -7294,13 +7241,6 @@
   <p:clrMapOvr>
     <a:masterClrMapping/>
   </p:clrMapOvr>
-  <p:timing>
-    <p:tnLst>
-      <p:par>
-        <p:cTn id="1" dur="indefinite" restart="never" nodeType="tmRoot"/>
-      </p:par>
-    </p:tnLst>
-  </p:timing>
 </p:sld>
 </file>
 
@@ -7358,10 +7298,9 @@
                     <a:p>
                       <a:pPr algn="ctr"/>
                       <a:r>
-                        <a:rPr lang="en-US" dirty="0" smtClean="0"/>
+                        <a:rPr lang="en-US" dirty="0"/>
                         <a:t>L1 +</a:t>
                       </a:r>
-                      <a:endParaRPr lang="en-US" dirty="0"/>
                     </a:p>
                   </a:txBody>
                   <a:tcPr anchor="ctr"/>
@@ -7396,11 +7335,11 @@
                         <a:defRPr/>
                       </a:pPr>
                       <a:r>
-                        <a:rPr lang="en-US" sz="1400" b="0" dirty="0" smtClean="0"/>
+                        <a:rPr lang="en-US" sz="1400" b="0" dirty="0"/>
                         <a:t>Property (6): </a:t>
                       </a:r>
                       <a:r>
-                        <a:rPr lang="en-US" sz="1400" kern="1200" dirty="0" smtClean="0">
+                        <a:rPr lang="en-US" sz="1400" kern="1200" dirty="0">
                           <a:solidFill>
                             <a:schemeClr val="dk1"/>
                           </a:solidFill>
@@ -7412,7 +7351,7 @@
                         <a:t>Interventional outcome: Therapeutic response</a:t>
                       </a:r>
                       <a:r>
-                        <a:rPr lang="en-US" sz="1400" b="0" kern="1200" baseline="0" dirty="0" smtClean="0">
+                        <a:rPr lang="en-US" sz="1400" b="0" kern="1200" baseline="0" dirty="0">
                           <a:solidFill>
                             <a:schemeClr val="dk1"/>
                           </a:solidFill>
@@ -7423,7 +7362,7 @@
                         </a:rPr>
                         <a:t> (1)</a:t>
                       </a:r>
-                      <a:endParaRPr lang="en-US" sz="1400" b="0" dirty="0" smtClean="0"/>
+                      <a:endParaRPr lang="en-US" sz="1400" b="0" dirty="0"/>
                     </a:p>
                     <a:p>
                       <a:pPr marL="0" marR="0" indent="0" algn="ctr" defTabSz="914400" rtl="0" eaLnBrk="1" fontAlgn="auto" latinLnBrk="0" hangingPunct="1">
@@ -7443,7 +7382,7 @@
                         <a:tabLst/>
                         <a:defRPr/>
                       </a:pPr>
-                      <a:endParaRPr lang="en-US" sz="1400" b="0" dirty="0" smtClean="0"/>
+                      <a:endParaRPr lang="en-US" sz="1400" b="0" dirty="0"/>
                     </a:p>
                   </a:txBody>
                   <a:tcPr anchor="ctr" anchorCtr="1">
@@ -7484,7 +7423,7 @@
                         <a:defRPr/>
                       </a:pPr>
                       <a:r>
-                        <a:rPr lang="en-US" sz="1400" kern="1200" dirty="0" smtClean="0">
+                        <a:rPr lang="en-US" sz="1400" kern="1200" dirty="0">
                           <a:solidFill>
                             <a:schemeClr val="dk1"/>
                           </a:solidFill>
@@ -7496,24 +7435,24 @@
                         <a:t>Imaging observation (4): Enhancement pattern</a:t>
                       </a:r>
                       <a:r>
-                        <a:rPr lang="en-US" sz="1400" dirty="0" smtClean="0">
+                        <a:rPr lang="en-US" sz="1400" dirty="0">
                           <a:effectLst/>
                         </a:rPr>
                         <a:t> </a:t>
                       </a:r>
                       <a:r>
-                        <a:rPr lang="en-US" sz="1400" b="0" dirty="0" smtClean="0">
+                        <a:rPr lang="en-US" sz="1400" b="0" dirty="0">
                           <a:effectLst/>
                         </a:rPr>
                         <a:t>(3),</a:t>
                       </a:r>
                       <a:r>
-                        <a:rPr lang="en-US" sz="1400" b="0" baseline="0" dirty="0" smtClean="0">
+                        <a:rPr lang="en-US" sz="1400" b="0" baseline="0" dirty="0">
                           <a:effectLst/>
                         </a:rPr>
                         <a:t> Enhancement (1)</a:t>
                       </a:r>
-                      <a:endParaRPr lang="en-US" sz="1400" b="0" dirty="0" smtClean="0"/>
+                      <a:endParaRPr lang="en-US" sz="1400" b="0" dirty="0"/>
                     </a:p>
                   </a:txBody>
                   <a:tcPr anchor="ctr" anchorCtr="1">
@@ -7554,7 +7493,7 @@
                         <a:defRPr/>
                       </a:pPr>
                       <a:r>
-                        <a:rPr lang="en-US" sz="1400" kern="1200" dirty="0" smtClean="0">
+                        <a:rPr lang="en-US" sz="1400" kern="1200" dirty="0">
                           <a:solidFill>
                             <a:schemeClr val="dk1"/>
                           </a:solidFill>
@@ -7565,7 +7504,7 @@
                         </a:rPr>
                         <a:t>Imaging Modality (1)</a:t>
                       </a:r>
-                      <a:endParaRPr lang="en-US" sz="1400" b="0" dirty="0" smtClean="0"/>
+                      <a:endParaRPr lang="en-US" sz="1400" b="0" dirty="0"/>
                     </a:p>
                   </a:txBody>
                   <a:tcPr anchor="ctr" anchorCtr="1">
@@ -7606,7 +7545,7 @@
                         <a:defRPr/>
                       </a:pPr>
                       <a:r>
-                        <a:rPr lang="en-US" sz="1400" kern="1200" dirty="0" smtClean="0">
+                        <a:rPr lang="en-US" sz="1400" kern="1200" dirty="0">
                           <a:solidFill>
                             <a:schemeClr val="dk1"/>
                           </a:solidFill>
@@ -7618,7 +7557,7 @@
                         <a:t>Procedure:</a:t>
                       </a:r>
                       <a:r>
-                        <a:rPr lang="en-US" sz="1400" kern="1200" baseline="0" dirty="0" smtClean="0">
+                        <a:rPr lang="en-US" sz="1400" kern="1200" baseline="0" dirty="0">
                           <a:solidFill>
                             <a:schemeClr val="dk1"/>
                           </a:solidFill>
@@ -7629,7 +7568,7 @@
                         </a:rPr>
                         <a:t> Imaging Procedure (1)</a:t>
                       </a:r>
-                      <a:endParaRPr lang="en-US" sz="1400" b="0" dirty="0" smtClean="0"/>
+                      <a:endParaRPr lang="en-US" sz="1400" b="0" dirty="0"/>
                     </a:p>
                   </a:txBody>
                   <a:tcPr anchor="ctr" anchorCtr="1">
@@ -7660,13 +7599,6 @@
   <p:clrMapOvr>
     <a:masterClrMapping/>
   </p:clrMapOvr>
-  <p:timing>
-    <p:tnLst>
-      <p:par>
-        <p:cTn id="1" dur="indefinite" restart="never" nodeType="tmRoot"/>
-      </p:par>
-    </p:tnLst>
-  </p:timing>
 </p:sld>
 </file>
 

</xml_diff>